<commit_message>
Corrected clase 4 presentation, added the day 4 lab code that was modified in class
</commit_message>
<xml_diff>
--- a/Day4/clase/Modelos_Jerarquicos 2018 final.pptx
+++ b/Day4/clase/Modelos_Jerarquicos 2018 final.pptx
@@ -248,7 +248,7 @@
           <a:p>
             <a:fld id="{5E010FA0-6B04-9944-833C-E4494EFCB446}" type="datetimeFigureOut">
               <a:rPr lang="en-US" smtClean="0"/>
-              <a:t>1/10/18</a:t>
+              <a:t>1/14/18</a:t>
             </a:fld>
             <a:endParaRPr lang="en-US"/>
           </a:p>
@@ -877,7 +877,7 @@
           <a:p>
             <a:fld id="{31F9BD1C-34DA-CC47-AF9B-87A4BDD55FDF}" type="datetimeFigureOut">
               <a:rPr lang="en-US" smtClean="0"/>
-              <a:t>1/10/18</a:t>
+              <a:t>1/14/18</a:t>
             </a:fld>
             <a:endParaRPr lang="en-US"/>
           </a:p>
@@ -1066,7 +1066,7 @@
           <a:p>
             <a:fld id="{31F9BD1C-34DA-CC47-AF9B-87A4BDD55FDF}" type="datetimeFigureOut">
               <a:rPr lang="en-US" smtClean="0"/>
-              <a:t>1/10/18</a:t>
+              <a:t>1/14/18</a:t>
             </a:fld>
             <a:endParaRPr lang="en-US"/>
           </a:p>
@@ -1264,7 +1264,7 @@
           <a:p>
             <a:fld id="{31F9BD1C-34DA-CC47-AF9B-87A4BDD55FDF}" type="datetimeFigureOut">
               <a:rPr lang="en-US" smtClean="0"/>
-              <a:t>1/10/18</a:t>
+              <a:t>1/14/18</a:t>
             </a:fld>
             <a:endParaRPr lang="en-US"/>
           </a:p>
@@ -1519,7 +1519,7 @@
           <a:p>
             <a:fld id="{31F9BD1C-34DA-CC47-AF9B-87A4BDD55FDF}" type="datetimeFigureOut">
               <a:rPr lang="en-US" smtClean="0"/>
-              <a:t>1/10/18</a:t>
+              <a:t>1/14/18</a:t>
             </a:fld>
             <a:endParaRPr lang="en-US"/>
           </a:p>
@@ -1745,7 +1745,7 @@
           <a:p>
             <a:fld id="{31F9BD1C-34DA-CC47-AF9B-87A4BDD55FDF}" type="datetimeFigureOut">
               <a:rPr lang="en-US" smtClean="0"/>
-              <a:t>1/10/18</a:t>
+              <a:t>1/14/18</a:t>
             </a:fld>
             <a:endParaRPr lang="en-US"/>
           </a:p>
@@ -2057,7 +2057,7 @@
           <a:p>
             <a:fld id="{31F9BD1C-34DA-CC47-AF9B-87A4BDD55FDF}" type="datetimeFigureOut">
               <a:rPr lang="en-US" smtClean="0"/>
-              <a:t>1/10/18</a:t>
+              <a:t>1/14/18</a:t>
             </a:fld>
             <a:endParaRPr lang="en-US"/>
           </a:p>
@@ -2226,7 +2226,7 @@
           <a:p>
             <a:fld id="{31F9BD1C-34DA-CC47-AF9B-87A4BDD55FDF}" type="datetimeFigureOut">
               <a:rPr lang="en-US" smtClean="0"/>
-              <a:t>1/10/18</a:t>
+              <a:t>1/14/18</a:t>
             </a:fld>
             <a:endParaRPr lang="en-US"/>
           </a:p>
@@ -2414,7 +2414,7 @@
           <a:p>
             <a:fld id="{31F9BD1C-34DA-CC47-AF9B-87A4BDD55FDF}" type="datetimeFigureOut">
               <a:rPr lang="en-US" smtClean="0"/>
-              <a:t>1/10/18</a:t>
+              <a:t>1/14/18</a:t>
             </a:fld>
             <a:endParaRPr lang="en-US"/>
           </a:p>
@@ -2624,7 +2624,7 @@
           <a:p>
             <a:fld id="{31F9BD1C-34DA-CC47-AF9B-87A4BDD55FDF}" type="datetimeFigureOut">
               <a:rPr lang="en-US" smtClean="0"/>
-              <a:t>1/10/18</a:t>
+              <a:t>1/14/18</a:t>
             </a:fld>
             <a:endParaRPr lang="en-US"/>
           </a:p>
@@ -2930,7 +2930,7 @@
           <a:p>
             <a:fld id="{31F9BD1C-34DA-CC47-AF9B-87A4BDD55FDF}" type="datetimeFigureOut">
               <a:rPr lang="en-US" smtClean="0"/>
-              <a:t>1/10/18</a:t>
+              <a:t>1/14/18</a:t>
             </a:fld>
             <a:endParaRPr lang="en-US"/>
           </a:p>
@@ -3375,7 +3375,7 @@
           <a:p>
             <a:fld id="{31F9BD1C-34DA-CC47-AF9B-87A4BDD55FDF}" type="datetimeFigureOut">
               <a:rPr lang="en-US" smtClean="0"/>
-              <a:t>1/10/18</a:t>
+              <a:t>1/14/18</a:t>
             </a:fld>
             <a:endParaRPr lang="en-US"/>
           </a:p>
@@ -3511,7 +3511,7 @@
           <a:p>
             <a:fld id="{31F9BD1C-34DA-CC47-AF9B-87A4BDD55FDF}" type="datetimeFigureOut">
               <a:rPr lang="en-US" smtClean="0"/>
-              <a:t>1/10/18</a:t>
+              <a:t>1/14/18</a:t>
             </a:fld>
             <a:endParaRPr lang="en-US"/>
           </a:p>
@@ -3624,7 +3624,7 @@
           <a:p>
             <a:fld id="{31F9BD1C-34DA-CC47-AF9B-87A4BDD55FDF}" type="datetimeFigureOut">
               <a:rPr lang="en-US" smtClean="0"/>
-              <a:t>1/10/18</a:t>
+              <a:t>1/14/18</a:t>
             </a:fld>
             <a:endParaRPr lang="en-US"/>
           </a:p>
@@ -3919,7 +3919,7 @@
           <a:p>
             <a:fld id="{31F9BD1C-34DA-CC47-AF9B-87A4BDD55FDF}" type="datetimeFigureOut">
               <a:rPr lang="en-US" smtClean="0"/>
-              <a:t>1/10/18</a:t>
+              <a:t>1/14/18</a:t>
             </a:fld>
             <a:endParaRPr lang="en-US"/>
           </a:p>
@@ -4194,7 +4194,7 @@
           <a:p>
             <a:fld id="{31F9BD1C-34DA-CC47-AF9B-87A4BDD55FDF}" type="datetimeFigureOut">
               <a:rPr lang="en-US" smtClean="0"/>
-              <a:t>1/10/18</a:t>
+              <a:t>1/14/18</a:t>
             </a:fld>
             <a:endParaRPr lang="en-US"/>
           </a:p>
@@ -4489,7 +4489,7 @@
           <a:p>
             <a:fld id="{31F9BD1C-34DA-CC47-AF9B-87A4BDD55FDF}" type="datetimeFigureOut">
               <a:rPr lang="en-US" smtClean="0"/>
-              <a:t>1/10/18</a:t>
+              <a:t>1/14/18</a:t>
             </a:fld>
             <a:endParaRPr lang="en-US"/>
           </a:p>
@@ -5296,6 +5296,13 @@
   <p:clrMapOvr>
     <a:masterClrMapping/>
   </p:clrMapOvr>
+  <p:timing>
+    <p:tnLst>
+      <p:par>
+        <p:cTn id="1" dur="indefinite" restart="never" nodeType="tmRoot"/>
+      </p:par>
+    </p:tnLst>
+  </p:timing>
 </p:sld>
 </file>
 
@@ -5671,6 +5678,13 @@
   <p:clrMapOvr>
     <a:masterClrMapping/>
   </p:clrMapOvr>
+  <p:timing>
+    <p:tnLst>
+      <p:par>
+        <p:cTn id="1" dur="indefinite" restart="never" nodeType="tmRoot"/>
+      </p:par>
+    </p:tnLst>
+  </p:timing>
 </p:sld>
 </file>
 
@@ -5802,6 +5816,13 @@
   <p:clrMapOvr>
     <a:masterClrMapping/>
   </p:clrMapOvr>
+  <p:timing>
+    <p:tnLst>
+      <p:par>
+        <p:cTn id="1" dur="indefinite" restart="never" nodeType="tmRoot"/>
+      </p:par>
+    </p:tnLst>
+  </p:timing>
 </p:sld>
 </file>
 
@@ -6030,7 +6051,7 @@
             <a:graphicData uri="http://schemas.openxmlformats.org/presentationml/2006/ole">
               <mc:AlternateContent xmlns:mc="http://schemas.openxmlformats.org/markup-compatibility/2006">
                 <mc:Choice xmlns:v="urn:schemas-microsoft-com:vml" Requires="v">
-                  <p:oleObj spid="_x0000_s7872" name="Equation" r:id="rId3" imgW="152268" imgH="215713" progId="Equation.DSMT4">
+                  <p:oleObj spid="_x0000_s7946" name="Equation" r:id="rId3" imgW="152268" imgH="215713" progId="Equation.DSMT4">
                     <p:embed/>
                   </p:oleObj>
                 </mc:Choice>
@@ -6129,7 +6150,7 @@
             <a:graphicData uri="http://schemas.openxmlformats.org/presentationml/2006/ole">
               <mc:AlternateContent xmlns:mc="http://schemas.openxmlformats.org/markup-compatibility/2006">
                 <mc:Choice xmlns:v="urn:schemas-microsoft-com:vml" Requires="v">
-                  <p:oleObj spid="_x0000_s7873" name="Equation" r:id="rId5" imgW="164885" imgH="215619" progId="Equation.DSMT4">
+                  <p:oleObj spid="_x0000_s7947" name="Equation" r:id="rId5" imgW="164885" imgH="215619" progId="Equation.DSMT4">
                     <p:embed/>
                   </p:oleObj>
                 </mc:Choice>
@@ -6228,7 +6249,7 @@
             <a:graphicData uri="http://schemas.openxmlformats.org/presentationml/2006/ole">
               <mc:AlternateContent xmlns:mc="http://schemas.openxmlformats.org/markup-compatibility/2006">
                 <mc:Choice xmlns:v="urn:schemas-microsoft-com:vml" Requires="v">
-                  <p:oleObj spid="_x0000_s7874" name="Equation" r:id="rId7" imgW="203112" imgH="228501" progId="Equation.DSMT4">
+                  <p:oleObj spid="_x0000_s7948" name="Equation" r:id="rId7" imgW="203112" imgH="228501" progId="Equation.DSMT4">
                     <p:embed/>
                   </p:oleObj>
                 </mc:Choice>
@@ -6327,7 +6348,7 @@
             <a:graphicData uri="http://schemas.openxmlformats.org/presentationml/2006/ole">
               <mc:AlternateContent xmlns:mc="http://schemas.openxmlformats.org/markup-compatibility/2006">
                 <mc:Choice xmlns:v="urn:schemas-microsoft-com:vml" Requires="v">
-                  <p:oleObj spid="_x0000_s7875" name="Equation" r:id="rId9" imgW="203112" imgH="228501" progId="Equation.DSMT4">
+                  <p:oleObj spid="_x0000_s7949" name="Equation" r:id="rId9" imgW="203112" imgH="228501" progId="Equation.DSMT4">
                     <p:embed/>
                   </p:oleObj>
                 </mc:Choice>
@@ -6426,7 +6447,7 @@
             <a:graphicData uri="http://schemas.openxmlformats.org/presentationml/2006/ole">
               <mc:AlternateContent xmlns:mc="http://schemas.openxmlformats.org/markup-compatibility/2006">
                 <mc:Choice xmlns:v="urn:schemas-microsoft-com:vml" Requires="v">
-                  <p:oleObj spid="_x0000_s7876" name="Equation" r:id="rId11" imgW="152268" imgH="215713" progId="Equation.DSMT4">
+                  <p:oleObj spid="_x0000_s7950" name="Equation" r:id="rId11" imgW="152268" imgH="215713" progId="Equation.DSMT4">
                     <p:embed/>
                   </p:oleObj>
                 </mc:Choice>
@@ -6525,7 +6546,7 @@
             <a:graphicData uri="http://schemas.openxmlformats.org/presentationml/2006/ole">
               <mc:AlternateContent xmlns:mc="http://schemas.openxmlformats.org/markup-compatibility/2006">
                 <mc:Choice xmlns:v="urn:schemas-microsoft-com:vml" Requires="v">
-                  <p:oleObj spid="_x0000_s7877" name="Equation" r:id="rId13" imgW="164885" imgH="215619" progId="Equation.DSMT4">
+                  <p:oleObj spid="_x0000_s7951" name="Equation" r:id="rId13" imgW="164885" imgH="215619" progId="Equation.DSMT4">
                     <p:embed/>
                   </p:oleObj>
                 </mc:Choice>
@@ -6624,7 +6645,7 @@
             <a:graphicData uri="http://schemas.openxmlformats.org/presentationml/2006/ole">
               <mc:AlternateContent xmlns:mc="http://schemas.openxmlformats.org/markup-compatibility/2006">
                 <mc:Choice xmlns:v="urn:schemas-microsoft-com:vml" Requires="v">
-                  <p:oleObj spid="_x0000_s7878" name="Equation" r:id="rId15" imgW="215806" imgH="228501" progId="Equation.DSMT4">
+                  <p:oleObj spid="_x0000_s7952" name="Equation" r:id="rId15" imgW="215806" imgH="228501" progId="Equation.DSMT4">
                     <p:embed/>
                   </p:oleObj>
                 </mc:Choice>
@@ -6723,7 +6744,7 @@
             <a:graphicData uri="http://schemas.openxmlformats.org/presentationml/2006/ole">
               <mc:AlternateContent xmlns:mc="http://schemas.openxmlformats.org/markup-compatibility/2006">
                 <mc:Choice xmlns:v="urn:schemas-microsoft-com:vml" Requires="v">
-                  <p:oleObj spid="_x0000_s7879" name="Equation" r:id="rId17" imgW="203112" imgH="228501" progId="Equation.DSMT4">
+                  <p:oleObj spid="_x0000_s7953" name="Equation" r:id="rId17" imgW="203112" imgH="228501" progId="Equation.DSMT4">
                     <p:embed/>
                   </p:oleObj>
                 </mc:Choice>
@@ -8760,7 +8781,7 @@
             <a:graphicData uri="http://schemas.openxmlformats.org/presentationml/2006/ole">
               <mc:AlternateContent xmlns:mc="http://schemas.openxmlformats.org/markup-compatibility/2006">
                 <mc:Choice xmlns:v="urn:schemas-microsoft-com:vml" Requires="v">
-                  <p:oleObj spid="_x0000_s7880" name="Equation" r:id="rId19" imgW="622030" imgH="228501" progId="Equation.DSMT4">
+                  <p:oleObj spid="_x0000_s7954" name="Equation" r:id="rId19" imgW="622030" imgH="228501" progId="Equation.DSMT4">
                     <p:embed/>
                   </p:oleObj>
                 </mc:Choice>
@@ -8854,7 +8875,7 @@
             <a:graphicData uri="http://schemas.openxmlformats.org/presentationml/2006/ole">
               <mc:AlternateContent xmlns:mc="http://schemas.openxmlformats.org/markup-compatibility/2006">
                 <mc:Choice xmlns:v="urn:schemas-microsoft-com:vml" Requires="v">
-                  <p:oleObj spid="_x0000_s7881" name="Equation" r:id="rId21" imgW="774364" imgH="228501" progId="Equation.3">
+                  <p:oleObj spid="_x0000_s7955" name="Equation" r:id="rId21" imgW="774364" imgH="228501" progId="Equation.3">
                     <p:embed/>
                   </p:oleObj>
                 </mc:Choice>
@@ -8948,7 +8969,7 @@
             <a:graphicData uri="http://schemas.openxmlformats.org/presentationml/2006/ole">
               <mc:AlternateContent xmlns:mc="http://schemas.openxmlformats.org/markup-compatibility/2006">
                 <mc:Choice xmlns:v="urn:schemas-microsoft-com:vml" Requires="v">
-                  <p:oleObj spid="_x0000_s7882" name="Equation" r:id="rId23" imgW="317225" imgH="203024" progId="Equation.3">
+                  <p:oleObj spid="_x0000_s7956" name="Equation" r:id="rId23" imgW="317225" imgH="203024" progId="Equation.3">
                     <p:embed/>
                   </p:oleObj>
                 </mc:Choice>
@@ -9048,7 +9069,7 @@
           <a:graphicData uri="http://schemas.openxmlformats.org/presentationml/2006/ole">
             <mc:AlternateContent xmlns:mc="http://schemas.openxmlformats.org/markup-compatibility/2006">
               <mc:Choice xmlns:v="urn:schemas-microsoft-com:vml" Requires="v">
-                <p:oleObj spid="_x0000_s7883" name="Equation" r:id="rId25" imgW="685800" imgH="241300" progId="Equation.3">
+                <p:oleObj spid="_x0000_s7957" name="Equation" r:id="rId25" imgW="685800" imgH="241300" progId="Equation.3">
                   <p:embed/>
                 </p:oleObj>
               </mc:Choice>
@@ -9124,6 +9145,13 @@
   <p:clrMapOvr>
     <a:masterClrMapping/>
   </p:clrMapOvr>
+  <p:timing>
+    <p:tnLst>
+      <p:par>
+        <p:cTn id="1" dur="indefinite" restart="never" nodeType="tmRoot"/>
+      </p:par>
+    </p:tnLst>
+  </p:timing>
 </p:sld>
 </file>
 
@@ -9239,6 +9267,13 @@
   <p:clrMapOvr>
     <a:masterClrMapping/>
   </p:clrMapOvr>
+  <p:timing>
+    <p:tnLst>
+      <p:par>
+        <p:cTn id="1" dur="indefinite" restart="never" nodeType="tmRoot"/>
+      </p:par>
+    </p:tnLst>
+  </p:timing>
 </p:sld>
 </file>
 
@@ -9582,6 +9617,13 @@
   <p:clrMapOvr>
     <a:masterClrMapping/>
   </p:clrMapOvr>
+  <p:timing>
+    <p:tnLst>
+      <p:par>
+        <p:cTn id="1" dur="indefinite" restart="never" nodeType="tmRoot"/>
+      </p:par>
+    </p:tnLst>
+  </p:timing>
 </p:sld>
 </file>
 
@@ -9701,6 +9743,13 @@
   <p:clrMapOvr>
     <a:masterClrMapping/>
   </p:clrMapOvr>
+  <p:timing>
+    <p:tnLst>
+      <p:par>
+        <p:cTn id="1" dur="indefinite" restart="never" nodeType="tmRoot"/>
+      </p:par>
+    </p:tnLst>
+  </p:timing>
 </p:sld>
 </file>
 
@@ -9798,6 +9847,13 @@
   <p:clrMapOvr>
     <a:masterClrMapping/>
   </p:clrMapOvr>
+  <p:timing>
+    <p:tnLst>
+      <p:par>
+        <p:cTn id="1" dur="indefinite" restart="never" nodeType="tmRoot"/>
+      </p:par>
+    </p:tnLst>
+  </p:timing>
 </p:sld>
 </file>
 
@@ -9893,7 +9949,12 @@
             <p:ph idx="1"/>
           </p:nvPr>
         </p:nvSpPr>
-        <p:spPr/>
+        <p:spPr>
+          <a:xfrm>
+            <a:off x="457200" y="1843750"/>
+            <a:ext cx="8229600" cy="4530725"/>
+          </a:xfrm>
+        </p:spPr>
         <p:txBody>
           <a:bodyPr/>
           <a:lstStyle/>
@@ -9913,12 +9974,13 @@
             <a:endParaRPr lang="es-AR" dirty="0" smtClean="0"/>
           </a:p>
           <a:p>
-            <a:endParaRPr lang="es-AR" dirty="0" smtClean="0"/>
-          </a:p>
-          <a:p>
             <a:r>
               <a:rPr lang="es-AR" dirty="0" smtClean="0"/>
-              <a:t>Que distribución también permite la media de Poisson tener variación adicional (es decir, la media es una variable aleatoria)? </a:t>
+              <a:t>Que </a:t>
+            </a:r>
+            <a:r>
+              <a:rPr lang="es-AR" dirty="0" smtClean="0"/>
+              <a:t>distribución también permite la media de Poisson tener variación adicional (es decir, la media es una variable aleatoria)? </a:t>
             </a:r>
           </a:p>
           <a:p>
@@ -9926,63 +9988,30 @@
           </a:p>
         </p:txBody>
       </p:sp>
-      <p:graphicFrame>
-        <p:nvGraphicFramePr>
-          <p:cNvPr id="4" name="Object 3"/>
-          <p:cNvGraphicFramePr>
-            <a:graphicFrameLocks noChangeAspect="1"/>
-          </p:cNvGraphicFramePr>
-          <p:nvPr>
-            <p:extLst>
-              <p:ext uri="{D42A27DB-BD31-4B8C-83A1-F6EECF244321}">
-                <p14:modId xmlns:p14="http://schemas.microsoft.com/office/powerpoint/2010/main" val="2420247067"/>
-              </p:ext>
-            </p:extLst>
-          </p:nvPr>
-        </p:nvGraphicFramePr>
-        <p:xfrm>
-          <a:off x="2849292" y="2775613"/>
-          <a:ext cx="2971800" cy="1333500"/>
-        </p:xfrm>
-        <a:graphic>
-          <a:graphicData uri="http://schemas.openxmlformats.org/presentationml/2006/ole">
-            <mc:AlternateContent xmlns:mc="http://schemas.openxmlformats.org/markup-compatibility/2006">
-              <mc:Choice xmlns:v="urn:schemas-microsoft-com:vml" Requires="v">
-                <p:oleObj spid="_x0000_s1180" name="Equation" r:id="rId3" imgW="990600" imgH="444500" progId="Equation.3">
-                  <p:embed/>
-                </p:oleObj>
-              </mc:Choice>
-              <mc:Fallback>
-                <p:oleObj name="Equation" r:id="rId3" imgW="990600" imgH="444500" progId="Equation.3">
-                  <p:embed/>
-                  <p:pic>
-                    <p:nvPicPr>
-                      <p:cNvPr id="0" name=""/>
-                      <p:cNvPicPr/>
-                      <p:nvPr/>
-                    </p:nvPicPr>
-                    <p:blipFill>
-                      <a:blip r:embed="rId4"/>
-                      <a:stretch>
-                        <a:fillRect/>
-                      </a:stretch>
-                    </p:blipFill>
-                    <p:spPr>
-                      <a:xfrm>
-                        <a:off x="2849292" y="2775613"/>
-                        <a:ext cx="2971800" cy="1333500"/>
-                      </a:xfrm>
-                      <a:prstGeom prst="rect">
-                        <a:avLst/>
-                      </a:prstGeom>
-                    </p:spPr>
-                  </p:pic>
-                </p:oleObj>
-              </mc:Fallback>
-            </mc:AlternateContent>
-          </a:graphicData>
-        </a:graphic>
-      </p:graphicFrame>
+      <p:pic>
+        <p:nvPicPr>
+          <p:cNvPr id="5" name="Picture 4"/>
+          <p:cNvPicPr>
+            <a:picLocks noChangeAspect="1"/>
+          </p:cNvPicPr>
+          <p:nvPr/>
+        </p:nvPicPr>
+        <p:blipFill>
+          <a:blip r:embed="rId2"/>
+          <a:stretch>
+            <a:fillRect/>
+          </a:stretch>
+        </p:blipFill>
+        <p:spPr>
+          <a:xfrm>
+            <a:off x="2105025" y="2699412"/>
+            <a:ext cx="4686300" cy="1409700"/>
+          </a:xfrm>
+          <a:prstGeom prst="rect">
+            <a:avLst/>
+          </a:prstGeom>
+        </p:spPr>
+      </p:pic>
     </p:spTree>
     <p:extLst>
       <p:ext uri="{BB962C8B-B14F-4D97-AF65-F5344CB8AC3E}">
@@ -9993,6 +10022,13 @@
   <p:clrMapOvr>
     <a:masterClrMapping/>
   </p:clrMapOvr>
+  <p:timing>
+    <p:tnLst>
+      <p:par>
+        <p:cTn id="1" dur="indefinite" restart="never" nodeType="tmRoot"/>
+      </p:par>
+    </p:tnLst>
+  </p:timing>
 </p:sld>
 </file>
 
@@ -10176,6 +10212,13 @@
   <p:clrMapOvr>
     <a:masterClrMapping/>
   </p:clrMapOvr>
+  <p:timing>
+    <p:tnLst>
+      <p:par>
+        <p:cTn id="1" dur="indefinite" restart="never" nodeType="tmRoot"/>
+      </p:par>
+    </p:tnLst>
+  </p:timing>
 </p:sld>
 </file>
 
@@ -10374,6 +10417,13 @@
   <p:clrMapOvr>
     <a:masterClrMapping/>
   </p:clrMapOvr>
+  <p:timing>
+    <p:tnLst>
+      <p:par>
+        <p:cTn id="1" dur="indefinite" restart="never" nodeType="tmRoot"/>
+      </p:par>
+    </p:tnLst>
+  </p:timing>
 </p:sld>
 </file>
 
@@ -10481,6 +10531,13 @@
   <p:clrMapOvr>
     <a:masterClrMapping/>
   </p:clrMapOvr>
+  <p:timing>
+    <p:tnLst>
+      <p:par>
+        <p:cTn id="1" dur="indefinite" restart="never" nodeType="tmRoot"/>
+      </p:par>
+    </p:tnLst>
+  </p:timing>
 </p:sld>
 </file>
 
@@ -10587,6 +10644,13 @@
   <p:clrMapOvr>
     <a:masterClrMapping/>
   </p:clrMapOvr>
+  <p:timing>
+    <p:tnLst>
+      <p:par>
+        <p:cTn id="1" dur="indefinite" restart="never" nodeType="tmRoot"/>
+      </p:par>
+    </p:tnLst>
+  </p:timing>
 </p:sld>
 </file>
 
@@ -10699,6 +10763,13 @@
   <p:clrMapOvr>
     <a:masterClrMapping/>
   </p:clrMapOvr>
+  <p:timing>
+    <p:tnLst>
+      <p:par>
+        <p:cTn id="1" dur="indefinite" restart="never" nodeType="tmRoot"/>
+      </p:par>
+    </p:tnLst>
+  </p:timing>
 </p:sld>
 </file>
 
@@ -10838,7 +10909,7 @@
           <a:graphicData uri="http://schemas.openxmlformats.org/presentationml/2006/ole">
             <mc:AlternateContent xmlns:mc="http://schemas.openxmlformats.org/markup-compatibility/2006">
               <mc:Choice xmlns:v="urn:schemas-microsoft-com:vml" Requires="v">
-                <p:oleObj spid="_x0000_s6438" name="Equation" r:id="rId3" imgW="3454200" imgH="419040" progId="Equation.DSMT4">
+                <p:oleObj spid="_x0000_s6452" name="Equation" r:id="rId3" imgW="3454200" imgH="419040" progId="Equation.DSMT4">
                   <p:embed/>
                 </p:oleObj>
               </mc:Choice>
@@ -10895,7 +10966,7 @@
           <a:graphicData uri="http://schemas.openxmlformats.org/presentationml/2006/ole">
             <mc:AlternateContent xmlns:mc="http://schemas.openxmlformats.org/markup-compatibility/2006">
               <mc:Choice xmlns:v="urn:schemas-microsoft-com:vml" Requires="v">
-                <p:oleObj spid="_x0000_s6439" name="Equation" r:id="rId5" imgW="2743200" imgH="825480" progId="Equation.3">
+                <p:oleObj spid="_x0000_s6453" name="Equation" r:id="rId5" imgW="2743200" imgH="825480" progId="Equation.3">
                   <p:embed/>
                 </p:oleObj>
               </mc:Choice>
@@ -10940,6 +11011,13 @@
   <p:clrMapOvr>
     <a:masterClrMapping/>
   </p:clrMapOvr>
+  <p:timing>
+    <p:tnLst>
+      <p:par>
+        <p:cTn id="1" dur="indefinite" restart="never" nodeType="tmRoot"/>
+      </p:par>
+    </p:tnLst>
+  </p:timing>
 </p:sld>
 </file>
 
@@ -11055,6 +11133,13 @@
   <p:clrMapOvr>
     <a:masterClrMapping/>
   </p:clrMapOvr>
+  <p:timing>
+    <p:tnLst>
+      <p:par>
+        <p:cTn id="1" dur="indefinite" restart="never" nodeType="tmRoot"/>
+      </p:par>
+    </p:tnLst>
+  </p:timing>
 </p:sld>
 </file>
 
@@ -11092,7 +11177,11 @@
           <a:p>
             <a:r>
               <a:rPr lang="es-ES_tradnl" dirty="0" smtClean="0"/>
-              <a:t>Un método de modelar los datos (no sugerido) </a:t>
+              <a:t>Un método de modelar los datos (</a:t>
+            </a:r>
+            <a:r>
+              <a:rPr lang="es-ES_tradnl" dirty="0" smtClean="0"/>
+              <a:t>no se recomienda) </a:t>
             </a:r>
             <a:endParaRPr lang="es-ES_tradnl" dirty="0"/>
           </a:p>
@@ -11189,6 +11278,13 @@
   <p:clrMapOvr>
     <a:masterClrMapping/>
   </p:clrMapOvr>
+  <p:timing>
+    <p:tnLst>
+      <p:par>
+        <p:cTn id="1" dur="indefinite" restart="never" nodeType="tmRoot"/>
+      </p:par>
+    </p:tnLst>
+  </p:timing>
 </p:sld>
 </file>
 
@@ -11229,9 +11325,10 @@
               <a:t>Modelos con efectos aleatorios </a:t>
             </a:r>
             <a:r>
-              <a:rPr lang="es-ES_tradnl" dirty="0"/>
-              <a:t>(el método sugerido)</a:t>
-            </a:r>
+              <a:rPr lang="es-ES_tradnl" dirty="0" smtClean="0"/>
+              <a:t>(se recomienda)</a:t>
+            </a:r>
+            <a:endParaRPr lang="es-ES_tradnl" dirty="0"/>
           </a:p>
         </p:txBody>
       </p:sp>
@@ -11465,6 +11562,13 @@
   <p:clrMapOvr>
     <a:masterClrMapping/>
   </p:clrMapOvr>
+  <p:timing>
+    <p:tnLst>
+      <p:par>
+        <p:cTn id="1" dur="indefinite" restart="never" nodeType="tmRoot"/>
+      </p:par>
+    </p:tnLst>
+  </p:timing>
 </p:sld>
 </file>
 
@@ -11582,6 +11686,13 @@
   <p:clrMapOvr>
     <a:masterClrMapping/>
   </p:clrMapOvr>
+  <p:timing>
+    <p:tnLst>
+      <p:par>
+        <p:cTn id="1" dur="indefinite" restart="never" nodeType="tmRoot"/>
+      </p:par>
+    </p:tnLst>
+  </p:timing>
 </p:sld>
 </file>
 
@@ -11894,6 +12005,13 @@
   <p:clrMapOvr>
     <a:masterClrMapping/>
   </p:clrMapOvr>
+  <p:timing>
+    <p:tnLst>
+      <p:par>
+        <p:cTn id="1" dur="indefinite" restart="never" nodeType="tmRoot"/>
+      </p:par>
+    </p:tnLst>
+  </p:timing>
 </p:sld>
 </file>
 
@@ -12118,6 +12236,13 @@
   <p:clrMapOvr>
     <a:masterClrMapping/>
   </p:clrMapOvr>
+  <p:timing>
+    <p:tnLst>
+      <p:par>
+        <p:cTn id="1" dur="indefinite" restart="never" nodeType="tmRoot"/>
+      </p:par>
+    </p:tnLst>
+  </p:timing>
 </p:sld>
 </file>
 
@@ -12243,6 +12368,13 @@
   <p:clrMapOvr>
     <a:masterClrMapping/>
   </p:clrMapOvr>
+  <p:timing>
+    <p:tnLst>
+      <p:par>
+        <p:cTn id="1" dur="indefinite" restart="never" nodeType="tmRoot"/>
+      </p:par>
+    </p:tnLst>
+  </p:timing>
 </p:sld>
 </file>
 
@@ -13069,6 +13201,13 @@
   <p:clrMapOvr>
     <a:masterClrMapping/>
   </p:clrMapOvr>
+  <p:timing>
+    <p:tnLst>
+      <p:par>
+        <p:cTn id="1" dur="indefinite" restart="never" nodeType="tmRoot"/>
+      </p:par>
+    </p:tnLst>
+  </p:timing>
 </p:sld>
 </file>
 
@@ -13311,6 +13450,13 @@
   <p:clrMapOvr>
     <a:masterClrMapping/>
   </p:clrMapOvr>
+  <p:timing>
+    <p:tnLst>
+      <p:par>
+        <p:cTn id="1" dur="indefinite" restart="never" nodeType="tmRoot"/>
+      </p:par>
+    </p:tnLst>
+  </p:timing>
 </p:sld>
 </file>
 
@@ -14231,6 +14377,13 @@
   <p:clrMapOvr>
     <a:masterClrMapping/>
   </p:clrMapOvr>
+  <p:timing>
+    <p:tnLst>
+      <p:par>
+        <p:cTn id="1" dur="indefinite" restart="never" nodeType="tmRoot"/>
+      </p:par>
+    </p:tnLst>
+  </p:timing>
 </p:sld>
 </file>
 
@@ -14433,6 +14586,13 @@
   <p:clrMapOvr>
     <a:masterClrMapping/>
   </p:clrMapOvr>
+  <p:timing>
+    <p:tnLst>
+      <p:par>
+        <p:cTn id="1" dur="indefinite" restart="never" nodeType="tmRoot"/>
+      </p:par>
+    </p:tnLst>
+  </p:timing>
 </p:sld>
 </file>
 
@@ -15015,6 +15175,13 @@
   <p:clrMapOvr>
     <a:masterClrMapping/>
   </p:clrMapOvr>
+  <p:timing>
+    <p:tnLst>
+      <p:par>
+        <p:cTn id="1" dur="indefinite" restart="never" nodeType="tmRoot"/>
+      </p:par>
+    </p:tnLst>
+  </p:timing>
 </p:sld>
 </file>
 
@@ -15132,6 +15299,13 @@
   <p:clrMapOvr>
     <a:masterClrMapping/>
   </p:clrMapOvr>
+  <p:timing>
+    <p:tnLst>
+      <p:par>
+        <p:cTn id="1" dur="indefinite" restart="never" nodeType="tmRoot"/>
+      </p:par>
+    </p:tnLst>
+  </p:timing>
 </p:sld>
 </file>
 
@@ -15280,6 +15454,13 @@
   <p:clrMapOvr>
     <a:masterClrMapping/>
   </p:clrMapOvr>
+  <p:timing>
+    <p:tnLst>
+      <p:par>
+        <p:cTn id="1" dur="indefinite" restart="never" nodeType="tmRoot"/>
+      </p:par>
+    </p:tnLst>
+  </p:timing>
 </p:sld>
 </file>
 
@@ -15438,6 +15619,13 @@
   <p:clrMapOvr>
     <a:masterClrMapping/>
   </p:clrMapOvr>
+  <p:timing>
+    <p:tnLst>
+      <p:par>
+        <p:cTn id="1" dur="indefinite" restart="never" nodeType="tmRoot"/>
+      </p:par>
+    </p:tnLst>
+  </p:timing>
 </p:sld>
 </file>
 
@@ -15523,63 +15711,6 @@
           </a:p>
         </p:txBody>
       </p:sp>
-      <p:graphicFrame>
-        <p:nvGraphicFramePr>
-          <p:cNvPr id="6" name="Object 5"/>
-          <p:cNvGraphicFramePr>
-            <a:graphicFrameLocks noChangeAspect="1"/>
-          </p:cNvGraphicFramePr>
-          <p:nvPr>
-            <p:extLst>
-              <p:ext uri="{D42A27DB-BD31-4B8C-83A1-F6EECF244321}">
-                <p14:modId xmlns:p14="http://schemas.microsoft.com/office/powerpoint/2010/main" val="1142853724"/>
-              </p:ext>
-            </p:extLst>
-          </p:nvPr>
-        </p:nvGraphicFramePr>
-        <p:xfrm>
-          <a:off x="4689708" y="1997545"/>
-          <a:ext cx="3695700" cy="1485900"/>
-        </p:xfrm>
-        <a:graphic>
-          <a:graphicData uri="http://schemas.openxmlformats.org/presentationml/2006/ole">
-            <mc:AlternateContent xmlns:mc="http://schemas.openxmlformats.org/markup-compatibility/2006">
-              <mc:Choice xmlns:v="urn:schemas-microsoft-com:vml" Requires="v">
-                <p:oleObj spid="_x0000_s4251" name="Equation" r:id="rId3" imgW="1231900" imgH="495300" progId="Equation.3">
-                  <p:embed/>
-                </p:oleObj>
-              </mc:Choice>
-              <mc:Fallback>
-                <p:oleObj name="Equation" r:id="rId3" imgW="1231900" imgH="495300" progId="Equation.3">
-                  <p:embed/>
-                  <p:pic>
-                    <p:nvPicPr>
-                      <p:cNvPr id="0" name=""/>
-                      <p:cNvPicPr/>
-                      <p:nvPr/>
-                    </p:nvPicPr>
-                    <p:blipFill>
-                      <a:blip r:embed="rId4"/>
-                      <a:stretch>
-                        <a:fillRect/>
-                      </a:stretch>
-                    </p:blipFill>
-                    <p:spPr>
-                      <a:xfrm>
-                        <a:off x="4689708" y="1997545"/>
-                        <a:ext cx="3695700" cy="1485900"/>
-                      </a:xfrm>
-                      <a:prstGeom prst="rect">
-                        <a:avLst/>
-                      </a:prstGeom>
-                    </p:spPr>
-                  </p:pic>
-                </p:oleObj>
-              </mc:Fallback>
-            </mc:AlternateContent>
-          </a:graphicData>
-        </a:graphic>
-      </p:graphicFrame>
       <p:sp>
         <p:nvSpPr>
           <p:cNvPr id="7" name="TextBox 6"/>
@@ -15631,6 +15762,30 @@
           </a:p>
         </p:txBody>
       </p:sp>
+      <p:pic>
+        <p:nvPicPr>
+          <p:cNvPr id="3" name="Picture 2"/>
+          <p:cNvPicPr>
+            <a:picLocks noChangeAspect="1"/>
+          </p:cNvPicPr>
+          <p:nvPr/>
+        </p:nvPicPr>
+        <p:blipFill>
+          <a:blip r:embed="rId2"/>
+          <a:stretch>
+            <a:fillRect/>
+          </a:stretch>
+        </p:blipFill>
+        <p:spPr>
+          <a:xfrm>
+            <a:off x="4386262" y="1539067"/>
+            <a:ext cx="3733800" cy="2095500"/>
+          </a:xfrm>
+          <a:prstGeom prst="rect">
+            <a:avLst/>
+          </a:prstGeom>
+        </p:spPr>
+      </p:pic>
     </p:spTree>
     <p:extLst>
       <p:ext uri="{BB962C8B-B14F-4D97-AF65-F5344CB8AC3E}">
@@ -15641,6 +15796,13 @@
   <p:clrMapOvr>
     <a:masterClrMapping/>
   </p:clrMapOvr>
+  <p:timing>
+    <p:tnLst>
+      <p:par>
+        <p:cTn id="1" dur="indefinite" restart="never" nodeType="tmRoot"/>
+      </p:par>
+    </p:tnLst>
+  </p:timing>
 </p:sld>
 </file>
 
@@ -15791,6 +15953,13 @@
   <p:clrMapOvr>
     <a:masterClrMapping/>
   </p:clrMapOvr>
+  <p:timing>
+    <p:tnLst>
+      <p:par>
+        <p:cTn id="1" dur="indefinite" restart="never" nodeType="tmRoot"/>
+      </p:par>
+    </p:tnLst>
+  </p:timing>
 </p:sld>
 </file>
 
@@ -15908,63 +16077,6 @@
           </a:p>
         </p:txBody>
       </p:sp>
-      <p:graphicFrame>
-        <p:nvGraphicFramePr>
-          <p:cNvPr id="6" name="Object 5"/>
-          <p:cNvGraphicFramePr>
-            <a:graphicFrameLocks noChangeAspect="1"/>
-          </p:cNvGraphicFramePr>
-          <p:nvPr>
-            <p:extLst>
-              <p:ext uri="{D42A27DB-BD31-4B8C-83A1-F6EECF244321}">
-                <p14:modId xmlns:p14="http://schemas.microsoft.com/office/powerpoint/2010/main" val="2861734990"/>
-              </p:ext>
-            </p:extLst>
-          </p:nvPr>
-        </p:nvGraphicFramePr>
-        <p:xfrm>
-          <a:off x="4689475" y="1616075"/>
-          <a:ext cx="3695700" cy="2247900"/>
-        </p:xfrm>
-        <a:graphic>
-          <a:graphicData uri="http://schemas.openxmlformats.org/presentationml/2006/ole">
-            <mc:AlternateContent xmlns:mc="http://schemas.openxmlformats.org/markup-compatibility/2006">
-              <mc:Choice xmlns:v="urn:schemas-microsoft-com:vml" Requires="v">
-                <p:oleObj spid="_x0000_s5276" name="Equation" r:id="rId3" imgW="1231900" imgH="749300" progId="Equation.3">
-                  <p:embed/>
-                </p:oleObj>
-              </mc:Choice>
-              <mc:Fallback>
-                <p:oleObj name="Equation" r:id="rId3" imgW="1231900" imgH="749300" progId="Equation.3">
-                  <p:embed/>
-                  <p:pic>
-                    <p:nvPicPr>
-                      <p:cNvPr id="0" name=""/>
-                      <p:cNvPicPr/>
-                      <p:nvPr/>
-                    </p:nvPicPr>
-                    <p:blipFill>
-                      <a:blip r:embed="rId4"/>
-                      <a:stretch>
-                        <a:fillRect/>
-                      </a:stretch>
-                    </p:blipFill>
-                    <p:spPr>
-                      <a:xfrm>
-                        <a:off x="4689475" y="1616075"/>
-                        <a:ext cx="3695700" cy="2247900"/>
-                      </a:xfrm>
-                      <a:prstGeom prst="rect">
-                        <a:avLst/>
-                      </a:prstGeom>
-                    </p:spPr>
-                  </p:pic>
-                </p:oleObj>
-              </mc:Fallback>
-            </mc:AlternateContent>
-          </a:graphicData>
-        </a:graphic>
-      </p:graphicFrame>
       <p:sp>
         <p:nvSpPr>
           <p:cNvPr id="7" name="TextBox 6"/>
@@ -15973,7 +16085,7 @@
         </p:nvSpPr>
         <p:spPr>
           <a:xfrm>
-            <a:off x="4689475" y="4048550"/>
+            <a:off x="4703762" y="4848650"/>
             <a:ext cx="3695700" cy="1077218"/>
           </a:xfrm>
           <a:prstGeom prst="rect">
@@ -16022,6 +16134,30 @@
           </a:p>
         </p:txBody>
       </p:sp>
+      <p:pic>
+        <p:nvPicPr>
+          <p:cNvPr id="3" name="Picture 2"/>
+          <p:cNvPicPr>
+            <a:picLocks noChangeAspect="1"/>
+          </p:cNvPicPr>
+          <p:nvPr/>
+        </p:nvPicPr>
+        <p:blipFill>
+          <a:blip r:embed="rId2"/>
+          <a:stretch>
+            <a:fillRect/>
+          </a:stretch>
+        </p:blipFill>
+        <p:spPr>
+          <a:xfrm>
+            <a:off x="4414838" y="1417638"/>
+            <a:ext cx="3771900" cy="3429000"/>
+          </a:xfrm>
+          <a:prstGeom prst="rect">
+            <a:avLst/>
+          </a:prstGeom>
+        </p:spPr>
+      </p:pic>
     </p:spTree>
     <p:extLst>
       <p:ext uri="{BB962C8B-B14F-4D97-AF65-F5344CB8AC3E}">
@@ -16032,6 +16168,13 @@
   <p:clrMapOvr>
     <a:masterClrMapping/>
   </p:clrMapOvr>
+  <p:timing>
+    <p:tnLst>
+      <p:par>
+        <p:cTn id="1" dur="indefinite" restart="never" nodeType="tmRoot"/>
+      </p:par>
+    </p:tnLst>
+  </p:timing>
 </p:sld>
 </file>
 
@@ -16321,6 +16464,13 @@
   <p:clrMapOvr>
     <a:masterClrMapping/>
   </p:clrMapOvr>
+  <p:timing>
+    <p:tnLst>
+      <p:par>
+        <p:cTn id="1" dur="indefinite" restart="never" nodeType="tmRoot"/>
+      </p:par>
+    </p:tnLst>
+  </p:timing>
 </p:sld>
 </file>
 

</xml_diff>